<commit_message>
changed 4 to 5 in title slide
</commit_message>
<xml_diff>
--- a/slides/Unit 2 - LC 101 - Class 5.pptx
+++ b/slides/Unit 2 - LC 101 - Class 5.pptx
@@ -6710,12 +6710,8 @@
           <a:lstStyle/>
           <a:p>
             <a:r>
-              <a:rPr lang="en-US"/>
-              <a:t>Studio 2 Solution </a:t>
-            </a:r>
-            <a:r>
               <a:rPr lang="en-US" dirty="0"/>
-              <a:t>(last class)</a:t>
+              <a:t>Studio 2 Solution (last class)</a:t>
             </a:r>
           </a:p>
         </p:txBody>
@@ -6828,9 +6824,9 @@
             </a:pPr>
             <a:r>
               <a:rPr lang="en"/>
-              <a:t>Unit 2 - Class 4</a:t>
+              <a:t>Unit 2 - Class 5</a:t>
             </a:r>
-            <a:endParaRPr/>
+            <a:endParaRPr dirty="0"/>
           </a:p>
         </p:txBody>
       </p:sp>

</xml_diff>